<commit_message>
public new pp version
</commit_message>
<xml_diff>
--- a/Presentation.pptx
+++ b/Presentation.pptx
@@ -301,7 +301,7 @@
           <a:p>
             <a:fld id="{2F3E8B1C-86EF-43CF-8304-249481088644}" type="datetimeFigureOut">
               <a:rPr lang="en-US" smtClean="0"/>
-              <a:t>16/10/2023</a:t>
+              <a:t>10/17/23</a:t>
             </a:fld>
             <a:endParaRPr lang="en-US"/>
           </a:p>
@@ -499,7 +499,7 @@
           <a:p>
             <a:fld id="{2F3E8B1C-86EF-43CF-8304-249481088644}" type="datetimeFigureOut">
               <a:rPr lang="en-US" smtClean="0"/>
-              <a:t>16/10/2023</a:t>
+              <a:t>10/17/23</a:t>
             </a:fld>
             <a:endParaRPr lang="en-US"/>
           </a:p>
@@ -709,7 +709,7 @@
           <a:p>
             <a:fld id="{2F3E8B1C-86EF-43CF-8304-249481088644}" type="datetimeFigureOut">
               <a:rPr lang="en-US" smtClean="0"/>
-              <a:t>16/10/2023</a:t>
+              <a:t>10/17/23</a:t>
             </a:fld>
             <a:endParaRPr lang="en-US"/>
           </a:p>
@@ -907,7 +907,7 @@
           <a:p>
             <a:fld id="{2F3E8B1C-86EF-43CF-8304-249481088644}" type="datetimeFigureOut">
               <a:rPr lang="en-US" smtClean="0"/>
-              <a:t>16/10/2023</a:t>
+              <a:t>10/17/23</a:t>
             </a:fld>
             <a:endParaRPr lang="en-US"/>
           </a:p>
@@ -1183,7 +1183,7 @@
           <a:p>
             <a:fld id="{2F3E8B1C-86EF-43CF-8304-249481088644}" type="datetimeFigureOut">
               <a:rPr lang="en-US" smtClean="0"/>
-              <a:t>16/10/2023</a:t>
+              <a:t>10/17/23</a:t>
             </a:fld>
             <a:endParaRPr lang="en-US"/>
           </a:p>
@@ -1456,7 +1456,7 @@
           <a:p>
             <a:fld id="{2F3E8B1C-86EF-43CF-8304-249481088644}" type="datetimeFigureOut">
               <a:rPr lang="en-US" smtClean="0"/>
-              <a:t>16/10/2023</a:t>
+              <a:t>10/17/23</a:t>
             </a:fld>
             <a:endParaRPr lang="en-US"/>
           </a:p>
@@ -1878,7 +1878,7 @@
           <a:p>
             <a:fld id="{2F3E8B1C-86EF-43CF-8304-249481088644}" type="datetimeFigureOut">
               <a:rPr lang="en-US" smtClean="0"/>
-              <a:t>16/10/2023</a:t>
+              <a:t>10/17/23</a:t>
             </a:fld>
             <a:endParaRPr lang="en-US"/>
           </a:p>
@@ -2020,7 +2020,7 @@
           <a:p>
             <a:fld id="{2F3E8B1C-86EF-43CF-8304-249481088644}" type="datetimeFigureOut">
               <a:rPr lang="en-US" smtClean="0"/>
-              <a:t>16/10/2023</a:t>
+              <a:t>10/17/23</a:t>
             </a:fld>
             <a:endParaRPr lang="en-US"/>
           </a:p>
@@ -2133,7 +2133,7 @@
           <a:p>
             <a:fld id="{2F3E8B1C-86EF-43CF-8304-249481088644}" type="datetimeFigureOut">
               <a:rPr lang="en-US" smtClean="0"/>
-              <a:t>16/10/2023</a:t>
+              <a:t>10/17/23</a:t>
             </a:fld>
             <a:endParaRPr lang="en-US"/>
           </a:p>
@@ -2446,7 +2446,7 @@
           <a:p>
             <a:fld id="{2F3E8B1C-86EF-43CF-8304-249481088644}" type="datetimeFigureOut">
               <a:rPr lang="en-US" smtClean="0"/>
-              <a:t>16/10/2023</a:t>
+              <a:t>10/17/23</a:t>
             </a:fld>
             <a:endParaRPr lang="en-US"/>
           </a:p>
@@ -2738,7 +2738,7 @@
           <a:p>
             <a:fld id="{2F3E8B1C-86EF-43CF-8304-249481088644}" type="datetimeFigureOut">
               <a:rPr lang="en-US" smtClean="0"/>
-              <a:t>16/10/2023</a:t>
+              <a:t>10/17/23</a:t>
             </a:fld>
             <a:endParaRPr lang="en-US"/>
           </a:p>
@@ -2981,7 +2981,7 @@
             <a:fld id="{2F3E8B1C-86EF-43CF-8304-249481088644}" type="datetimeFigureOut">
               <a:rPr lang="en-US" smtClean="0"/>
               <a:pPr/>
-              <a:t>16/10/2023</a:t>
+              <a:t>10/17/23</a:t>
             </a:fld>
             <a:endParaRPr lang="en-US"/>
           </a:p>
@@ -10851,7 +10851,7 @@
           <a:p>
             <a:pPr algn="l"/>
             <a:r>
-              <a:rPr lang="en-US" b="1" i="0">
+              <a:rPr lang="en-US" b="1" i="0" dirty="0">
                 <a:solidFill>
                   <a:srgbClr val="000000"/>
                 </a:solidFill>
@@ -10928,7 +10928,7 @@
           <a:lstStyle/>
           <a:p>
             <a:r>
-              <a:rPr lang="en-US" b="0" i="0">
+              <a:rPr lang="en-US" b="0" i="0" dirty="0">
                 <a:solidFill>
                   <a:srgbClr val="23272F"/>
                 </a:solidFill>
@@ -10937,7 +10937,7 @@
               </a:rPr>
               <a:t>React will call your cleanup function each time before the Effect runs again, and one final time when the component unmounts (gets removed).</a:t>
             </a:r>
-            <a:endParaRPr lang="en-US"/>
+            <a:endParaRPr lang="en-US" dirty="0"/>
           </a:p>
         </p:txBody>
       </p:sp>
@@ -11097,8 +11097,8 @@
         </p:nvSpPr>
         <p:spPr>
           <a:xfrm>
-            <a:off x="5972806" y="2387153"/>
-            <a:ext cx="6094428" cy="400110"/>
+            <a:off x="6097572" y="1632253"/>
+            <a:ext cx="5393793" cy="1938992"/>
           </a:xfrm>
           <a:prstGeom prst="rect">
             <a:avLst/>
@@ -11111,12 +11111,74 @@
           </a:bodyPr>
           <a:lstStyle/>
           <a:p>
-            <a:r>
-              <a:rPr lang="en-US" sz="2000">
+            <a:pPr marL="342900" indent="-342900">
+              <a:buFont typeface="Arial" panose="020B0604020202020204" pitchFamily="34" charset="0"/>
+              <a:buChar char="•"/>
+            </a:pPr>
+            <a:r>
+              <a:rPr lang="en-US" sz="2000" dirty="0">
                 <a:latin typeface="Optimistic Display"/>
               </a:rPr>
               <a:t>Custom Hooks are a mechanism to reuse stateful logic</a:t>
             </a:r>
+          </a:p>
+          <a:p>
+            <a:pPr marL="342900" indent="-342900">
+              <a:buFont typeface="Arial" panose="020B0604020202020204" pitchFamily="34" charset="0"/>
+              <a:buChar char="•"/>
+            </a:pPr>
+            <a:r>
+              <a:rPr lang="en-US" sz="2000" dirty="0">
+                <a:solidFill>
+                  <a:srgbClr val="23272F"/>
+                </a:solidFill>
+                <a:latin typeface="Optimistic Text"/>
+              </a:rPr>
+              <a:t>Hook names must start with </a:t>
+            </a:r>
+            <a:r>
+              <a:rPr lang="en-US" sz="2000" b="1" dirty="0">
+                <a:solidFill>
+                  <a:srgbClr val="23272F"/>
+                </a:solidFill>
+                <a:latin typeface="Optimistic Text"/>
+              </a:rPr>
+              <a:t>use</a:t>
+            </a:r>
+            <a:r>
+              <a:rPr lang="en-US" sz="2000" dirty="0">
+                <a:solidFill>
+                  <a:srgbClr val="23272F"/>
+                </a:solidFill>
+                <a:latin typeface="Optimistic Text"/>
+              </a:rPr>
+              <a:t> followed by a capital letter</a:t>
+            </a:r>
+          </a:p>
+          <a:p>
+            <a:pPr marL="342900" indent="-342900">
+              <a:buFont typeface="Arial" panose="020B0604020202020204" pitchFamily="34" charset="0"/>
+              <a:buChar char="•"/>
+            </a:pPr>
+            <a:r>
+              <a:rPr lang="en-US" sz="2000" dirty="0">
+                <a:solidFill>
+                  <a:srgbClr val="23272F"/>
+                </a:solidFill>
+                <a:latin typeface="Optimistic Text"/>
+              </a:rPr>
+              <a:t>Hooks may return arbitrary values.</a:t>
+            </a:r>
+            <a:endParaRPr lang="en-US" sz="2000" dirty="0"/>
+          </a:p>
+          <a:p>
+            <a:pPr marL="342900" indent="-342900">
+              <a:buFont typeface="Arial" panose="020B0604020202020204" pitchFamily="34" charset="0"/>
+              <a:buChar char="•"/>
+            </a:pPr>
+            <a:endParaRPr lang="en-US" sz="2000" dirty="0">
+              <a:latin typeface="Optimistic Display"/>
+            </a:endParaRPr>
           </a:p>
         </p:txBody>
       </p:sp>
@@ -11197,6 +11259,104 @@
                                           <p:spTgt spid="9">
                                             <p:txEl>
                                               <p:pRg st="0" end="0"/>
+                                            </p:txEl>
+                                          </p:spTgt>
+                                        </p:tgtEl>
+                                        <p:attrNameLst>
+                                          <p:attrName>style.visibility</p:attrName>
+                                        </p:attrNameLst>
+                                      </p:cBhvr>
+                                      <p:to>
+                                        <p:strVal val="visible"/>
+                                      </p:to>
+                                    </p:set>
+                                  </p:childTnLst>
+                                </p:cTn>
+                              </p:par>
+                            </p:childTnLst>
+                          </p:cTn>
+                        </p:par>
+                      </p:childTnLst>
+                    </p:cTn>
+                  </p:par>
+                  <p:par>
+                    <p:cTn id="7" fill="hold">
+                      <p:stCondLst>
+                        <p:cond delay="indefinite"/>
+                      </p:stCondLst>
+                      <p:childTnLst>
+                        <p:par>
+                          <p:cTn id="8" fill="hold">
+                            <p:stCondLst>
+                              <p:cond delay="0"/>
+                            </p:stCondLst>
+                            <p:childTnLst>
+                              <p:par>
+                                <p:cTn id="9" presetID="1" presetClass="entr" presetSubtype="0" fill="hold" nodeType="clickEffect">
+                                  <p:stCondLst>
+                                    <p:cond delay="0"/>
+                                  </p:stCondLst>
+                                  <p:childTnLst>
+                                    <p:set>
+                                      <p:cBhvr>
+                                        <p:cTn id="10" dur="1" fill="hold">
+                                          <p:stCondLst>
+                                            <p:cond delay="0"/>
+                                          </p:stCondLst>
+                                        </p:cTn>
+                                        <p:tgtEl>
+                                          <p:spTgt spid="9">
+                                            <p:txEl>
+                                              <p:pRg st="1" end="1"/>
+                                            </p:txEl>
+                                          </p:spTgt>
+                                        </p:tgtEl>
+                                        <p:attrNameLst>
+                                          <p:attrName>style.visibility</p:attrName>
+                                        </p:attrNameLst>
+                                      </p:cBhvr>
+                                      <p:to>
+                                        <p:strVal val="visible"/>
+                                      </p:to>
+                                    </p:set>
+                                  </p:childTnLst>
+                                </p:cTn>
+                              </p:par>
+                            </p:childTnLst>
+                          </p:cTn>
+                        </p:par>
+                      </p:childTnLst>
+                    </p:cTn>
+                  </p:par>
+                  <p:par>
+                    <p:cTn id="11" fill="hold">
+                      <p:stCondLst>
+                        <p:cond delay="indefinite"/>
+                      </p:stCondLst>
+                      <p:childTnLst>
+                        <p:par>
+                          <p:cTn id="12" fill="hold">
+                            <p:stCondLst>
+                              <p:cond delay="0"/>
+                            </p:stCondLst>
+                            <p:childTnLst>
+                              <p:par>
+                                <p:cTn id="13" presetID="1" presetClass="entr" presetSubtype="0" fill="hold" nodeType="clickEffect">
+                                  <p:stCondLst>
+                                    <p:cond delay="0"/>
+                                  </p:stCondLst>
+                                  <p:childTnLst>
+                                    <p:set>
+                                      <p:cBhvr>
+                                        <p:cTn id="14" dur="1" fill="hold">
+                                          <p:stCondLst>
+                                            <p:cond delay="0"/>
+                                          </p:stCondLst>
+                                        </p:cTn>
+                                        <p:tgtEl>
+                                          <p:spTgt spid="9">
+                                            <p:txEl>
+                                              <p:pRg st="2" end="2"/>
                                             </p:txEl>
                                           </p:spTgt>
                                         </p:tgtEl>
@@ -12434,11 +12594,11 @@
   <p:clrMapOvr>
     <a:masterClrMapping/>
   </p:clrMapOvr>
-  <mc:AlternateContent xmlns:mc="http://schemas.openxmlformats.org/markup-compatibility/2006">
-    <mc:Choice xmlns:p14="http://schemas.microsoft.com/office/powerpoint/2010/main" Requires="p14">
+  <mc:AlternateContent xmlns:mc="http://schemas.openxmlformats.org/markup-compatibility/2006" xmlns:p14="http://schemas.microsoft.com/office/powerpoint/2010/main">
+    <mc:Choice Requires="p14">
       <p:transition p14:dur="10"/>
     </mc:Choice>
-    <mc:Fallback>
+    <mc:Fallback xmlns="">
       <p:transition/>
     </mc:Fallback>
   </mc:AlternateContent>

</xml_diff>